<commit_message>
디지털 논리회로, swift programming 10주차
</commit_message>
<xml_diff>
--- a/4-1/소프트웨어 종합설계/9주차/졸업작품 Activity Diagram.pptx
+++ b/4-1/소프트웨어 종합설계/9주차/졸업작품 Activity Diagram.pptx
@@ -293,7 +293,7 @@
           <a:p>
             <a:fld id="{CA0C9A70-06BB-774B-8A5A-F2019B565F3F}" type="datetimeFigureOut">
               <a:rPr kumimoji="1" lang="ko-Kore-KR" altLang="en-US" smtClean="0"/>
-              <a:t>2022. 4. 28.</a:t>
+              <a:t>2022. 4. 29.</a:t>
             </a:fld>
             <a:endParaRPr kumimoji="1" lang="ko-Kore-KR" altLang="en-US"/>
           </a:p>
@@ -493,7 +493,7 @@
           <a:p>
             <a:fld id="{CA0C9A70-06BB-774B-8A5A-F2019B565F3F}" type="datetimeFigureOut">
               <a:rPr kumimoji="1" lang="ko-Kore-KR" altLang="en-US" smtClean="0"/>
-              <a:t>2022. 4. 28.</a:t>
+              <a:t>2022. 4. 29.</a:t>
             </a:fld>
             <a:endParaRPr kumimoji="1" lang="ko-Kore-KR" altLang="en-US"/>
           </a:p>
@@ -703,7 +703,7 @@
           <a:p>
             <a:fld id="{CA0C9A70-06BB-774B-8A5A-F2019B565F3F}" type="datetimeFigureOut">
               <a:rPr kumimoji="1" lang="ko-Kore-KR" altLang="en-US" smtClean="0"/>
-              <a:t>2022. 4. 28.</a:t>
+              <a:t>2022. 4. 29.</a:t>
             </a:fld>
             <a:endParaRPr kumimoji="1" lang="ko-Kore-KR" altLang="en-US"/>
           </a:p>
@@ -903,7 +903,7 @@
           <a:p>
             <a:fld id="{CA0C9A70-06BB-774B-8A5A-F2019B565F3F}" type="datetimeFigureOut">
               <a:rPr kumimoji="1" lang="ko-Kore-KR" altLang="en-US" smtClean="0"/>
-              <a:t>2022. 4. 28.</a:t>
+              <a:t>2022. 4. 29.</a:t>
             </a:fld>
             <a:endParaRPr kumimoji="1" lang="ko-Kore-KR" altLang="en-US"/>
           </a:p>
@@ -1179,7 +1179,7 @@
           <a:p>
             <a:fld id="{CA0C9A70-06BB-774B-8A5A-F2019B565F3F}" type="datetimeFigureOut">
               <a:rPr kumimoji="1" lang="ko-Kore-KR" altLang="en-US" smtClean="0"/>
-              <a:t>2022. 4. 28.</a:t>
+              <a:t>2022. 4. 29.</a:t>
             </a:fld>
             <a:endParaRPr kumimoji="1" lang="ko-Kore-KR" altLang="en-US"/>
           </a:p>
@@ -1447,7 +1447,7 @@
           <a:p>
             <a:fld id="{CA0C9A70-06BB-774B-8A5A-F2019B565F3F}" type="datetimeFigureOut">
               <a:rPr kumimoji="1" lang="ko-Kore-KR" altLang="en-US" smtClean="0"/>
-              <a:t>2022. 4. 28.</a:t>
+              <a:t>2022. 4. 29.</a:t>
             </a:fld>
             <a:endParaRPr kumimoji="1" lang="ko-Kore-KR" altLang="en-US"/>
           </a:p>
@@ -1862,7 +1862,7 @@
           <a:p>
             <a:fld id="{CA0C9A70-06BB-774B-8A5A-F2019B565F3F}" type="datetimeFigureOut">
               <a:rPr kumimoji="1" lang="ko-Kore-KR" altLang="en-US" smtClean="0"/>
-              <a:t>2022. 4. 28.</a:t>
+              <a:t>2022. 4. 29.</a:t>
             </a:fld>
             <a:endParaRPr kumimoji="1" lang="ko-Kore-KR" altLang="en-US"/>
           </a:p>
@@ -2004,7 +2004,7 @@
           <a:p>
             <a:fld id="{CA0C9A70-06BB-774B-8A5A-F2019B565F3F}" type="datetimeFigureOut">
               <a:rPr kumimoji="1" lang="ko-Kore-KR" altLang="en-US" smtClean="0"/>
-              <a:t>2022. 4. 28.</a:t>
+              <a:t>2022. 4. 29.</a:t>
             </a:fld>
             <a:endParaRPr kumimoji="1" lang="ko-Kore-KR" altLang="en-US"/>
           </a:p>
@@ -2117,7 +2117,7 @@
           <a:p>
             <a:fld id="{CA0C9A70-06BB-774B-8A5A-F2019B565F3F}" type="datetimeFigureOut">
               <a:rPr kumimoji="1" lang="ko-Kore-KR" altLang="en-US" smtClean="0"/>
-              <a:t>2022. 4. 28.</a:t>
+              <a:t>2022. 4. 29.</a:t>
             </a:fld>
             <a:endParaRPr kumimoji="1" lang="ko-Kore-KR" altLang="en-US"/>
           </a:p>
@@ -2430,7 +2430,7 @@
           <a:p>
             <a:fld id="{CA0C9A70-06BB-774B-8A5A-F2019B565F3F}" type="datetimeFigureOut">
               <a:rPr kumimoji="1" lang="ko-Kore-KR" altLang="en-US" smtClean="0"/>
-              <a:t>2022. 4. 28.</a:t>
+              <a:t>2022. 4. 29.</a:t>
             </a:fld>
             <a:endParaRPr kumimoji="1" lang="ko-Kore-KR" altLang="en-US"/>
           </a:p>
@@ -2719,7 +2719,7 @@
           <a:p>
             <a:fld id="{CA0C9A70-06BB-774B-8A5A-F2019B565F3F}" type="datetimeFigureOut">
               <a:rPr kumimoji="1" lang="ko-Kore-KR" altLang="en-US" smtClean="0"/>
-              <a:t>2022. 4. 28.</a:t>
+              <a:t>2022. 4. 29.</a:t>
             </a:fld>
             <a:endParaRPr kumimoji="1" lang="ko-Kore-KR" altLang="en-US"/>
           </a:p>
@@ -2962,7 +2962,7 @@
           <a:p>
             <a:fld id="{CA0C9A70-06BB-774B-8A5A-F2019B565F3F}" type="datetimeFigureOut">
               <a:rPr kumimoji="1" lang="ko-Kore-KR" altLang="en-US" smtClean="0"/>
-              <a:t>2022. 4. 28.</a:t>
+              <a:t>2022. 4. 29.</a:t>
             </a:fld>
             <a:endParaRPr kumimoji="1" lang="ko-Kore-KR" altLang="en-US"/>
           </a:p>

</xml_diff>